<commit_message>
Update huong dan cai dat flutter tren win
</commit_message>
<xml_diff>
--- a/Hướng dẫn cài đặt Flutter.pptx
+++ b/Hướng dẫn cài đặt Flutter.pptx
@@ -5,7 +5,7 @@
     <p:sldMasterId id="2147483666" r:id="rId1"/>
   </p:sldMasterIdLst>
   <p:notesMasterIdLst>
-    <p:notesMasterId r:id="rId9"/>
+    <p:notesMasterId r:id="rId12"/>
   </p:notesMasterIdLst>
   <p:sldIdLst>
     <p:sldId id="290" r:id="rId2"/>
@@ -15,6 +15,9 @@
     <p:sldId id="294" r:id="rId6"/>
     <p:sldId id="295" r:id="rId7"/>
     <p:sldId id="296" r:id="rId8"/>
+    <p:sldId id="297" r:id="rId9"/>
+    <p:sldId id="298" r:id="rId10"/>
+    <p:sldId id="299" r:id="rId11"/>
   </p:sldIdLst>
   <p:sldSz cx="9194800" cy="6896100"/>
   <p:notesSz cx="9194800" cy="6896100"/>
@@ -214,7 +217,7 @@
           <a:p>
             <a:fld id="{31DAC42F-ABCF-C745-A438-98CE1933CAE2}" type="datetimeFigureOut">
               <a:rPr lang="x-none" smtClean="0"/>
-              <a:t>2/2/2021</a:t>
+              <a:t>3/3/2021</a:t>
             </a:fld>
             <a:endParaRPr lang="x-none"/>
           </a:p>
@@ -727,7 +730,7 @@
           <a:p>
             <a:fld id="{791E7AF7-0306-2046-8DE4-92400D20E4E5}" type="datetime1">
               <a:rPr lang="en-US" smtClean="0"/>
-              <a:t>2/2/2021</a:t>
+              <a:t>3/3/2021</a:t>
             </a:fld>
             <a:endParaRPr lang="en-US"/>
           </a:p>
@@ -994,7 +997,7 @@
           <a:p>
             <a:fld id="{08DE6EC8-AD21-2140-BE47-A75734A97B88}" type="datetime1">
               <a:rPr lang="en-US" smtClean="0"/>
-              <a:t>2/2/2021</a:t>
+              <a:t>3/3/2021</a:t>
             </a:fld>
             <a:endParaRPr lang="en-US"/>
           </a:p>
@@ -1271,7 +1274,7 @@
           <a:p>
             <a:fld id="{A23A1A1F-2661-A443-B6E4-27B8E93BA68E}" type="datetime1">
               <a:rPr lang="en-US" smtClean="0"/>
-              <a:t>2/2/2021</a:t>
+              <a:t>3/3/2021</a:t>
             </a:fld>
             <a:endParaRPr lang="en-US"/>
           </a:p>
@@ -1548,7 +1551,7 @@
           <a:p>
             <a:fld id="{7F6D23A5-47A9-D847-BD80-AD3152E19BC3}" type="datetime1">
               <a:rPr lang="en-US" smtClean="0"/>
-              <a:t>2/2/2021</a:t>
+              <a:t>3/3/2021</a:t>
             </a:fld>
             <a:endParaRPr lang="en-US"/>
           </a:p>
@@ -1892,7 +1895,7 @@
           <a:p>
             <a:fld id="{E8E5E1F3-A585-AF48-A348-EE6FB103D765}" type="datetime1">
               <a:rPr lang="en-US" smtClean="0"/>
-              <a:t>2/2/2021</a:t>
+              <a:t>3/3/2021</a:t>
             </a:fld>
             <a:endParaRPr lang="en-US"/>
           </a:p>
@@ -2226,7 +2229,7 @@
           <a:p>
             <a:fld id="{8184906F-B311-9E44-BDD3-BB3A50F72D5B}" type="datetime1">
               <a:rPr lang="en-US" smtClean="0"/>
-              <a:t>2/2/2021</a:t>
+              <a:t>3/3/2021</a:t>
             </a:fld>
             <a:endParaRPr lang="en-US"/>
           </a:p>
@@ -2708,7 +2711,7 @@
           <a:p>
             <a:fld id="{D4FFF972-4396-A244-B298-BCD3C72008E2}" type="datetime1">
               <a:rPr lang="en-US" smtClean="0"/>
-              <a:t>2/2/2021</a:t>
+              <a:t>3/3/2021</a:t>
             </a:fld>
             <a:endParaRPr lang="en-US"/>
           </a:p>
@@ -2918,7 +2921,7 @@
           <a:p>
             <a:fld id="{EA6A6C56-987D-4A4E-B2C0-737E7C32F23A}" type="datetime1">
               <a:rPr lang="en-US" smtClean="0"/>
-              <a:t>2/2/2021</a:t>
+              <a:t>3/3/2021</a:t>
             </a:fld>
             <a:endParaRPr lang="en-US"/>
           </a:p>
@@ -3100,7 +3103,7 @@
           <a:p>
             <a:fld id="{2ACEDFC5-98E3-7C48-97CB-2FEC18E49D1F}" type="datetime1">
               <a:rPr lang="en-US" smtClean="0"/>
-              <a:t>2/2/2021</a:t>
+              <a:t>3/3/2021</a:t>
             </a:fld>
             <a:endParaRPr lang="en-US"/>
           </a:p>
@@ -3480,7 +3483,7 @@
           <a:p>
             <a:fld id="{47551CD9-1554-BD42-A016-1E59A4600CA6}" type="datetime1">
               <a:rPr lang="en-US" smtClean="0"/>
-              <a:t>2/2/2021</a:t>
+              <a:t>3/3/2021</a:t>
             </a:fld>
             <a:endParaRPr lang="en-US"/>
           </a:p>
@@ -3840,7 +3843,7 @@
           <a:p>
             <a:fld id="{57DD022C-BFAC-F647-908B-AD314C1730E1}" type="datetime1">
               <a:rPr lang="en-US" smtClean="0"/>
-              <a:t>2/2/2021</a:t>
+              <a:t>3/3/2021</a:t>
             </a:fld>
             <a:endParaRPr lang="en-US"/>
           </a:p>
@@ -4159,7 +4162,7 @@
           <a:p>
             <a:fld id="{644C6249-A139-AF4F-AC56-0D5C79645F3E}" type="datetime1">
               <a:rPr lang="en-US" smtClean="0"/>
-              <a:t>2/2/2021</a:t>
+              <a:t>3/3/2021</a:t>
             </a:fld>
             <a:endParaRPr lang="en-US"/>
           </a:p>
@@ -4679,7 +4682,7 @@
                 <a:latin typeface="Times New Roman" panose="02020603050405020304" pitchFamily="18" charset="0"/>
                 <a:cs typeface="Times New Roman" panose="02020603050405020304" pitchFamily="18" charset="0"/>
               </a:rPr>
-              <a:t>GIỚI THIỆU TỔNG QUAN VỀ FLUTTER</a:t>
+              <a:t>HƯỚNG DẪN CÀI ĐẶT FLUTTER</a:t>
             </a:r>
             <a:br>
               <a:rPr lang="en-US" sz="4073" b="1" dirty="0"/>
@@ -4711,7 +4714,7 @@
           <a:p>
             <a:fld id="{6C6AF4D0-7379-EB4D-BD37-E45BAC30BC74}" type="datetime1">
               <a:rPr lang="en-US" smtClean="0"/>
-              <a:t>2/2/2021</a:t>
+              <a:t>3/3/2021</a:t>
             </a:fld>
             <a:endParaRPr lang="en-US"/>
           </a:p>
@@ -4759,6 +4762,193 @@
     <p:extLst>
       <p:ext uri="{BB962C8B-B14F-4D97-AF65-F5344CB8AC3E}">
         <p14:creationId xmlns:p14="http://schemas.microsoft.com/office/powerpoint/2010/main" val="968520607"/>
+      </p:ext>
+    </p:extLst>
+  </p:cSld>
+  <p:clrMapOvr>
+    <a:masterClrMapping/>
+  </p:clrMapOvr>
+</p:sld>
+</file>
+
+<file path=ppt/slides/slide10.xml><?xml version="1.0" encoding="utf-8"?>
+<p:sld xmlns:a="http://schemas.openxmlformats.org/drawingml/2006/main" xmlns:r="http://schemas.openxmlformats.org/officeDocument/2006/relationships" xmlns:p="http://schemas.openxmlformats.org/presentationml/2006/main">
+  <p:cSld>
+    <p:spTree>
+      <p:nvGrpSpPr>
+        <p:cNvPr id="1" name=""/>
+        <p:cNvGrpSpPr/>
+        <p:nvPr/>
+      </p:nvGrpSpPr>
+      <p:grpSpPr>
+        <a:xfrm>
+          <a:off x="0" y="0"/>
+          <a:ext cx="0" cy="0"/>
+          <a:chOff x="0" y="0"/>
+          <a:chExt cx="0" cy="0"/>
+        </a:xfrm>
+      </p:grpSpPr>
+      <p:sp>
+        <p:nvSpPr>
+          <p:cNvPr id="4" name="Date Placeholder 3">
+            <a:extLst>
+              <a:ext uri="{FF2B5EF4-FFF2-40B4-BE49-F238E27FC236}">
+                <a16:creationId xmlns:a16="http://schemas.microsoft.com/office/drawing/2014/main" id="{66EACCF0-7776-490D-8852-C84AED4B3A7B}"/>
+              </a:ext>
+            </a:extLst>
+          </p:cNvPr>
+          <p:cNvSpPr>
+            <a:spLocks noGrp="1"/>
+          </p:cNvSpPr>
+          <p:nvPr>
+            <p:ph type="dt" sz="half" idx="10"/>
+          </p:nvPr>
+        </p:nvSpPr>
+        <p:spPr/>
+        <p:txBody>
+          <a:bodyPr/>
+          <a:lstStyle/>
+          <a:p>
+            <a:fld id="{7F6D23A5-47A9-D847-BD80-AD3152E19BC3}" type="datetime1">
+              <a:rPr lang="en-US" smtClean="0"/>
+              <a:t>3/3/2021</a:t>
+            </a:fld>
+            <a:endParaRPr lang="en-US"/>
+          </a:p>
+        </p:txBody>
+      </p:sp>
+      <p:sp>
+        <p:nvSpPr>
+          <p:cNvPr id="5" name="Slide Number Placeholder 4">
+            <a:extLst>
+              <a:ext uri="{FF2B5EF4-FFF2-40B4-BE49-F238E27FC236}">
+                <a16:creationId xmlns:a16="http://schemas.microsoft.com/office/drawing/2014/main" id="{0D0C12DF-78DF-4F3E-86B2-F71B51A75FF4}"/>
+              </a:ext>
+            </a:extLst>
+          </p:cNvPr>
+          <p:cNvSpPr>
+            <a:spLocks noGrp="1"/>
+          </p:cNvSpPr>
+          <p:nvPr>
+            <p:ph type="sldNum" sz="quarter" idx="12"/>
+          </p:nvPr>
+        </p:nvSpPr>
+        <p:spPr/>
+        <p:txBody>
+          <a:bodyPr/>
+          <a:lstStyle/>
+          <a:p>
+            <a:pPr marL="43180">
+              <a:lnSpc>
+                <a:spcPts val="1240"/>
+              </a:lnSpc>
+            </a:pPr>
+            <a:r>
+              <a:rPr lang="en-GB" spc="-165"/>
+              <a:t>1-</a:t>
+            </a:r>
+            <a:fld id="{81D60167-4931-47E6-BA6A-407CBD079E47}" type="slidenum">
+              <a:rPr spc="-165" smtClean="0"/>
+              <a:t>10</a:t>
+            </a:fld>
+            <a:endParaRPr spc="-165" dirty="0"/>
+          </a:p>
+        </p:txBody>
+      </p:sp>
+      <p:pic>
+        <p:nvPicPr>
+          <p:cNvPr id="7" name="Picture 6">
+            <a:extLst>
+              <a:ext uri="{FF2B5EF4-FFF2-40B4-BE49-F238E27FC236}">
+                <a16:creationId xmlns:a16="http://schemas.microsoft.com/office/drawing/2014/main" id="{95354061-EFD2-4253-90C0-894CD20ACCDD}"/>
+              </a:ext>
+            </a:extLst>
+          </p:cNvPr>
+          <p:cNvPicPr>
+            <a:picLocks noChangeAspect="1"/>
+          </p:cNvPicPr>
+          <p:nvPr/>
+        </p:nvPicPr>
+        <p:blipFill>
+          <a:blip r:embed="rId2"/>
+          <a:stretch>
+            <a:fillRect/>
+          </a:stretch>
+        </p:blipFill>
+        <p:spPr>
+          <a:xfrm>
+            <a:off x="711200" y="1314450"/>
+            <a:ext cx="8080059" cy="1972512"/>
+          </a:xfrm>
+          <a:prstGeom prst="rect">
+            <a:avLst/>
+          </a:prstGeom>
+        </p:spPr>
+      </p:pic>
+      <p:pic>
+        <p:nvPicPr>
+          <p:cNvPr id="9" name="Picture 8">
+            <a:extLst>
+              <a:ext uri="{FF2B5EF4-FFF2-40B4-BE49-F238E27FC236}">
+                <a16:creationId xmlns:a16="http://schemas.microsoft.com/office/drawing/2014/main" id="{FBEF4293-1279-4AA7-8BE9-8062A4D5B8A8}"/>
+              </a:ext>
+            </a:extLst>
+          </p:cNvPr>
+          <p:cNvPicPr>
+            <a:picLocks noChangeAspect="1"/>
+          </p:cNvPicPr>
+          <p:nvPr/>
+        </p:nvPicPr>
+        <p:blipFill>
+          <a:blip r:embed="rId3"/>
+          <a:stretch>
+            <a:fillRect/>
+          </a:stretch>
+        </p:blipFill>
+        <p:spPr>
+          <a:xfrm>
+            <a:off x="330973" y="3371850"/>
+            <a:ext cx="5703859" cy="3048000"/>
+          </a:xfrm>
+          <a:prstGeom prst="rect">
+            <a:avLst/>
+          </a:prstGeom>
+        </p:spPr>
+      </p:pic>
+      <p:pic>
+        <p:nvPicPr>
+          <p:cNvPr id="11" name="Picture 10">
+            <a:extLst>
+              <a:ext uri="{FF2B5EF4-FFF2-40B4-BE49-F238E27FC236}">
+                <a16:creationId xmlns:a16="http://schemas.microsoft.com/office/drawing/2014/main" id="{5DC2F119-FB5E-417C-9D72-8E077196A37D}"/>
+              </a:ext>
+            </a:extLst>
+          </p:cNvPr>
+          <p:cNvPicPr>
+            <a:picLocks noChangeAspect="1"/>
+          </p:cNvPicPr>
+          <p:nvPr/>
+        </p:nvPicPr>
+        <p:blipFill>
+          <a:blip r:embed="rId4"/>
+          <a:stretch>
+            <a:fillRect/>
+          </a:stretch>
+        </p:blipFill>
+        <p:spPr>
+          <a:xfrm>
+            <a:off x="6654800" y="2843781"/>
+            <a:ext cx="1687607" cy="3590925"/>
+          </a:xfrm>
+          <a:prstGeom prst="rect">
+            <a:avLst/>
+          </a:prstGeom>
+        </p:spPr>
+      </p:pic>
+    </p:spTree>
+    <p:extLst>
+      <p:ext uri="{BB962C8B-B14F-4D97-AF65-F5344CB8AC3E}">
+        <p14:creationId xmlns:p14="http://schemas.microsoft.com/office/powerpoint/2010/main" val="781126478"/>
       </p:ext>
     </p:extLst>
   </p:cSld>
@@ -4790,7 +4980,7 @@
           <p:cNvPr id="2" name="Title 1">
             <a:extLst>
               <a:ext uri="{FF2B5EF4-FFF2-40B4-BE49-F238E27FC236}">
-                <a16:creationId xmlns:a16="http://schemas.microsoft.com/office/drawing/2014/main" id="{1B7C75EC-69E3-4C22-A543-AC0F30B8683A}"/>
+                <a16:creationId xmlns:a16="http://schemas.microsoft.com/office/drawing/2014/main" id="{1DFBA9CC-A266-4178-970C-A2D5D2451EC3}"/>
               </a:ext>
             </a:extLst>
           </p:cNvPr>
@@ -4801,16 +4991,9 @@
             <p:ph type="title"/>
           </p:nvPr>
         </p:nvSpPr>
-        <p:spPr>
-          <a:xfrm>
-            <a:off x="1541128" y="367155"/>
-            <a:ext cx="7021529" cy="413895"/>
-          </a:xfrm>
-        </p:spPr>
-        <p:txBody>
-          <a:bodyPr>
-            <a:normAutofit fontScale="90000"/>
-          </a:bodyPr>
+        <p:spPr/>
+        <p:txBody>
+          <a:bodyPr/>
           <a:lstStyle/>
           <a:p>
             <a:r>
@@ -4818,21 +5001,34 @@
               <a:t>I. </a:t>
             </a:r>
             <a:r>
-              <a:rPr lang="en-US" dirty="0" err="1"/>
-              <a:t>Giới</a:t>
-            </a:r>
-            <a:r>
-              <a:rPr lang="en-US" dirty="0"/>
+              <a:rPr lang="en-US" b="1" dirty="0" err="1"/>
+              <a:t>Cấu</a:t>
+            </a:r>
+            <a:r>
+              <a:rPr lang="en-US" b="1" dirty="0"/>
               <a:t> </a:t>
             </a:r>
             <a:r>
-              <a:rPr lang="en-US" dirty="0" err="1"/>
-              <a:t>thiệu</a:t>
-            </a:r>
-            <a:r>
-              <a:rPr lang="en-US" dirty="0"/>
-              <a:t>.</a:t>
-            </a:r>
+              <a:rPr lang="en-US" b="1" dirty="0" err="1"/>
+              <a:t>hình</a:t>
+            </a:r>
+            <a:r>
+              <a:rPr lang="en-US" b="1" dirty="0"/>
+              <a:t> </a:t>
+            </a:r>
+            <a:r>
+              <a:rPr lang="en-US" b="1" dirty="0" err="1"/>
+              <a:t>hệ</a:t>
+            </a:r>
+            <a:r>
+              <a:rPr lang="en-US" b="1" dirty="0"/>
+              <a:t> </a:t>
+            </a:r>
+            <a:r>
+              <a:rPr lang="en-US" b="1" dirty="0" err="1"/>
+              <a:t>thống</a:t>
+            </a:r>
+            <a:endParaRPr lang="en-US" b="1" dirty="0"/>
           </a:p>
         </p:txBody>
       </p:sp>
@@ -4841,7 +5037,7 @@
           <p:cNvPr id="3" name="Content Placeholder 2">
             <a:extLst>
               <a:ext uri="{FF2B5EF4-FFF2-40B4-BE49-F238E27FC236}">
-                <a16:creationId xmlns:a16="http://schemas.microsoft.com/office/drawing/2014/main" id="{5B443D5A-83C3-4828-9734-B1B2E7DE03FD}"/>
+                <a16:creationId xmlns:a16="http://schemas.microsoft.com/office/drawing/2014/main" id="{FE821050-0D1E-4567-9A65-E1189A5184A9}"/>
               </a:ext>
             </a:extLst>
           </p:cNvPr>
@@ -4855,24 +5051,18 @@
         <p:spPr>
           <a:xfrm>
             <a:off x="431755" y="1439187"/>
-            <a:ext cx="2794045" cy="4904463"/>
+            <a:ext cx="2946445" cy="4893232"/>
           </a:xfrm>
         </p:spPr>
         <p:txBody>
-          <a:bodyPr/>
+          <a:bodyPr>
+            <a:normAutofit lnSpcReduction="10000"/>
+          </a:bodyPr>
           <a:lstStyle/>
           <a:p>
             <a:r>
               <a:rPr lang="en-US" dirty="0" err="1"/>
-              <a:t>Một</a:t>
-            </a:r>
-            <a:r>
-              <a:rPr lang="en-US" dirty="0"/>
-              <a:t> SDK </a:t>
-            </a:r>
-            <a:r>
-              <a:rPr lang="en-US" dirty="0" err="1"/>
-              <a:t>đa</a:t>
+              <a:t>Hệ</a:t>
             </a:r>
             <a:r>
               <a:rPr lang="en-US" dirty="0"/>
@@ -4880,7 +5070,7 @@
             </a:r>
             <a:r>
               <a:rPr lang="en-US" dirty="0" err="1"/>
-              <a:t>nền</a:t>
+              <a:t>điều</a:t>
             </a:r>
             <a:r>
               <a:rPr lang="en-US" dirty="0"/>
@@ -4888,7 +5078,15 @@
             </a:r>
             <a:r>
               <a:rPr lang="en-US" dirty="0" err="1"/>
-              <a:t>tảng</a:t>
+              <a:t>hành</a:t>
+            </a:r>
+            <a:r>
+              <a:rPr lang="en-US" dirty="0"/>
+              <a:t>: Windows 7 SP1 </a:t>
+            </a:r>
+            <a:r>
+              <a:rPr lang="en-US" dirty="0" err="1"/>
+              <a:t>trở</a:t>
             </a:r>
             <a:r>
               <a:rPr lang="en-US" dirty="0"/>
@@ -4896,17 +5094,15 @@
             </a:r>
             <a:r>
               <a:rPr lang="en-US" dirty="0" err="1"/>
-              <a:t>của</a:t>
+              <a:t>lên</a:t>
             </a:r>
             <a:r>
               <a:rPr lang="en-US" dirty="0"/>
-              <a:t> Google.</a:t>
-            </a:r>
-          </a:p>
-          <a:p>
+              <a:t> (64-bit), </a:t>
+            </a:r>
             <a:r>
               <a:rPr lang="en-US" dirty="0" err="1"/>
-              <a:t>Dựa</a:t>
+              <a:t>dựa</a:t>
             </a:r>
             <a:r>
               <a:rPr lang="en-US" dirty="0"/>
@@ -4918,11 +5114,20 @@
             </a:r>
             <a:r>
               <a:rPr lang="en-US" dirty="0"/>
-              <a:t> </a:t>
-            </a:r>
+              <a:t> x86-64.</a:t>
+            </a:r>
+          </a:p>
+          <a:p>
+            <a:r>
+              <a:rPr lang="vi-VN" dirty="0"/>
+              <a:t>Dung lượng đĩa: 1,32 GB (không bao gồm dung lượng đĩa cho IDE / công cụ).</a:t>
+            </a:r>
+            <a:endParaRPr lang="en-US" dirty="0"/>
+          </a:p>
+          <a:p>
             <a:r>
               <a:rPr lang="en-US" dirty="0" err="1"/>
-              <a:t>ngôn</a:t>
+              <a:t>Công</a:t>
             </a:r>
             <a:r>
               <a:rPr lang="en-US" dirty="0"/>
@@ -4930,166 +5135,24 @@
             </a:r>
             <a:r>
               <a:rPr lang="en-US" dirty="0" err="1"/>
-              <a:t>ngữ</a:t>
+              <a:t>cụ</a:t>
             </a:r>
             <a:r>
               <a:rPr lang="en-US" dirty="0"/>
-              <a:t> Dart.</a:t>
-            </a:r>
-          </a:p>
-          <a:p>
-            <a:r>
-              <a:rPr lang="en-US" dirty="0" err="1"/>
-              <a:t>Phát</a:t>
-            </a:r>
-            <a:r>
-              <a:rPr lang="en-US" dirty="0"/>
-              <a:t> </a:t>
-            </a:r>
-            <a:r>
-              <a:rPr lang="en-US" dirty="0" err="1"/>
-              <a:t>hành</a:t>
-            </a:r>
-            <a:r>
-              <a:rPr lang="en-US" dirty="0"/>
-              <a:t> </a:t>
-            </a:r>
-            <a:r>
-              <a:rPr lang="en-US" dirty="0" err="1"/>
-              <a:t>lần</a:t>
-            </a:r>
-            <a:r>
-              <a:rPr lang="en-US" dirty="0"/>
-              <a:t> </a:t>
-            </a:r>
-            <a:r>
-              <a:rPr lang="en-US" dirty="0" err="1"/>
-              <a:t>đầu</a:t>
-            </a:r>
-            <a:r>
-              <a:rPr lang="en-US" dirty="0"/>
-              <a:t> </a:t>
-            </a:r>
-            <a:r>
-              <a:rPr lang="en-US" dirty="0" err="1"/>
-              <a:t>tháng</a:t>
-            </a:r>
-            <a:r>
-              <a:rPr lang="en-US" dirty="0"/>
-              <a:t> 5 </a:t>
-            </a:r>
-            <a:r>
-              <a:rPr lang="en-US" dirty="0" err="1"/>
-              <a:t>năm</a:t>
-            </a:r>
-            <a:r>
-              <a:rPr lang="en-US" dirty="0"/>
-              <a:t> 2017.</a:t>
-            </a:r>
-          </a:p>
-          <a:p>
-            <a:r>
-              <a:rPr lang="en-US" dirty="0" err="1"/>
-              <a:t>Phiên</a:t>
-            </a:r>
-            <a:r>
-              <a:rPr lang="en-US" dirty="0"/>
-              <a:t> </a:t>
-            </a:r>
-            <a:r>
-              <a:rPr lang="en-US" dirty="0" err="1"/>
-              <a:t>bản</a:t>
-            </a:r>
-            <a:r>
-              <a:rPr lang="en-US" dirty="0"/>
-              <a:t> </a:t>
-            </a:r>
-            <a:r>
-              <a:rPr lang="en-US" dirty="0" err="1"/>
-              <a:t>ổn</a:t>
-            </a:r>
-            <a:r>
-              <a:rPr lang="en-US" dirty="0"/>
-              <a:t> </a:t>
-            </a:r>
-            <a:r>
-              <a:rPr lang="en-US" dirty="0" err="1"/>
-              <a:t>định</a:t>
-            </a:r>
-            <a:r>
-              <a:rPr lang="en-US" dirty="0"/>
-              <a:t> </a:t>
-            </a:r>
-            <a:r>
-              <a:rPr lang="en-US" dirty="0" err="1"/>
-              <a:t>tháng</a:t>
-            </a:r>
-            <a:r>
-              <a:rPr lang="en-US" dirty="0"/>
-              <a:t> 12 </a:t>
-            </a:r>
-            <a:r>
-              <a:rPr lang="en-US" dirty="0" err="1"/>
-              <a:t>năm</a:t>
-            </a:r>
-            <a:r>
-              <a:rPr lang="en-US" dirty="0"/>
-              <a:t> 2018.</a:t>
-            </a:r>
-          </a:p>
-          <a:p>
-            <a:r>
-              <a:rPr lang="en-US" dirty="0" err="1"/>
-              <a:t>Phụ</a:t>
-            </a:r>
-            <a:r>
-              <a:rPr lang="en-US" dirty="0"/>
-              <a:t> </a:t>
-            </a:r>
-            <a:r>
-              <a:rPr lang="en-US" dirty="0" err="1"/>
-              <a:t>hợp</a:t>
-            </a:r>
-            <a:r>
-              <a:rPr lang="en-US" dirty="0"/>
-              <a:t> </a:t>
-            </a:r>
-            <a:r>
-              <a:rPr lang="en-US" dirty="0" err="1"/>
-              <a:t>cho</a:t>
-            </a:r>
-            <a:r>
-              <a:rPr lang="en-US" dirty="0"/>
-              <a:t> </a:t>
-            </a:r>
-            <a:r>
-              <a:rPr lang="en-US" dirty="0" err="1"/>
-              <a:t>các</a:t>
-            </a:r>
-            <a:r>
-              <a:rPr lang="en-US" dirty="0"/>
-              <a:t> </a:t>
-            </a:r>
-            <a:r>
-              <a:rPr lang="en-US" dirty="0" err="1"/>
-              <a:t>dự</a:t>
-            </a:r>
-            <a:r>
-              <a:rPr lang="en-US" dirty="0"/>
-              <a:t> </a:t>
-            </a:r>
-            <a:r>
-              <a:rPr lang="en-US" dirty="0" err="1"/>
-              <a:t>án</a:t>
-            </a:r>
-            <a:r>
-              <a:rPr lang="en-US" dirty="0"/>
-              <a:t> </a:t>
-            </a:r>
-          </a:p>
-          <a:p>
+              <a:t>: </a:t>
+            </a:r>
+            <a:r>
+              <a:rPr lang="vi-VN" dirty="0"/>
+              <a:t>Windows PowerShell 5.0 hoặc mới hơn (cài đặt sẵn với Windows 10)Git cho Windows 2.x, với tùy chọn Sử dụng Git từ Windows Command Prompt.</a:t>
+            </a:r>
             <a:endParaRPr lang="en-US" dirty="0"/>
           </a:p>
+          <a:p>
+            <a:endParaRPr lang="en-US" dirty="0"/>
+          </a:p>
+          <a:p>
+            <a:endParaRPr lang="en-US" dirty="0"/>
+          </a:p>
         </p:txBody>
       </p:sp>
       <p:sp>
@@ -5097,7 +5160,7 @@
           <p:cNvPr id="4" name="Date Placeholder 3">
             <a:extLst>
               <a:ext uri="{FF2B5EF4-FFF2-40B4-BE49-F238E27FC236}">
-                <a16:creationId xmlns:a16="http://schemas.microsoft.com/office/drawing/2014/main" id="{0F32CB50-CB0A-424B-9353-3339A235FC33}"/>
+                <a16:creationId xmlns:a16="http://schemas.microsoft.com/office/drawing/2014/main" id="{2D1EB80E-C314-46E6-BAC7-D50C7C55C4C7}"/>
               </a:ext>
             </a:extLst>
           </p:cNvPr>
@@ -5115,7 +5178,7 @@
           <a:p>
             <a:fld id="{7F6D23A5-47A9-D847-BD80-AD3152E19BC3}" type="datetime1">
               <a:rPr lang="en-US" smtClean="0"/>
-              <a:t>2/2/2021</a:t>
+              <a:t>3/3/2021</a:t>
             </a:fld>
             <a:endParaRPr lang="en-US"/>
           </a:p>
@@ -5126,7 +5189,7 @@
           <p:cNvPr id="5" name="Slide Number Placeholder 4">
             <a:extLst>
               <a:ext uri="{FF2B5EF4-FFF2-40B4-BE49-F238E27FC236}">
-                <a16:creationId xmlns:a16="http://schemas.microsoft.com/office/drawing/2014/main" id="{1FA63BAB-7C43-4D32-9EC7-C4961FB0F5F0}"/>
+                <a16:creationId xmlns:a16="http://schemas.microsoft.com/office/drawing/2014/main" id="{C6F77DCA-E5B8-4069-AF38-021CAAD57AEB}"/>
               </a:ext>
             </a:extLst>
           </p:cNvPr>
@@ -5161,10 +5224,10 @@
       </p:sp>
       <p:pic>
         <p:nvPicPr>
-          <p:cNvPr id="11" name="Picture 10">
-            <a:extLst>
-              <a:ext uri="{FF2B5EF4-FFF2-40B4-BE49-F238E27FC236}">
-                <a16:creationId xmlns:a16="http://schemas.microsoft.com/office/drawing/2014/main" id="{A53BCD81-B652-4C52-AC8A-F06363EDFF71}"/>
+          <p:cNvPr id="9" name="Picture 8">
+            <a:extLst>
+              <a:ext uri="{FF2B5EF4-FFF2-40B4-BE49-F238E27FC236}">
+                <a16:creationId xmlns:a16="http://schemas.microsoft.com/office/drawing/2014/main" id="{C529E2FB-C60E-41BC-BB40-688D125005BA}"/>
               </a:ext>
             </a:extLst>
           </p:cNvPr>
@@ -5174,7 +5237,7 @@
           <p:nvPr/>
         </p:nvPicPr>
         <p:blipFill>
-          <a:blip r:embed="rId2" cstate="print">
+          <a:blip r:embed="rId2">
             <a:extLst>
               <a:ext uri="{28A0092B-C50C-407E-A947-70E740481C1C}">
                 <a14:useLocalDpi xmlns:a14="http://schemas.microsoft.com/office/drawing/2010/main" val="0"/>
@@ -5187,8 +5250,8 @@
         </p:blipFill>
         <p:spPr>
           <a:xfrm>
-            <a:off x="3484997" y="1439187"/>
-            <a:ext cx="5415232" cy="3027328"/>
+            <a:off x="3530600" y="1910218"/>
+            <a:ext cx="5350693" cy="3075663"/>
           </a:xfrm>
           <a:prstGeom prst="rect">
             <a:avLst/>
@@ -5198,7 +5261,7 @@
     </p:spTree>
     <p:extLst>
       <p:ext uri="{BB962C8B-B14F-4D97-AF65-F5344CB8AC3E}">
-        <p14:creationId xmlns:p14="http://schemas.microsoft.com/office/powerpoint/2010/main" val="3303028469"/>
+        <p14:creationId xmlns:p14="http://schemas.microsoft.com/office/powerpoint/2010/main" val="1434237021"/>
       </p:ext>
     </p:extLst>
   </p:cSld>
@@ -5230,7 +5293,7 @@
           <p:cNvPr id="2" name="Title 1">
             <a:extLst>
               <a:ext uri="{FF2B5EF4-FFF2-40B4-BE49-F238E27FC236}">
-                <a16:creationId xmlns:a16="http://schemas.microsoft.com/office/drawing/2014/main" id="{E05BE413-32C4-4E1E-9427-EFD5B6B3D2AB}"/>
+                <a16:creationId xmlns:a16="http://schemas.microsoft.com/office/drawing/2014/main" id="{02CA072C-7455-4D84-9AFF-41F597FE6F80}"/>
               </a:ext>
             </a:extLst>
           </p:cNvPr>
@@ -5252,7 +5315,7 @@
             </a:r>
             <a:r>
               <a:rPr lang="en-US" dirty="0" err="1"/>
-              <a:t>Kiến</a:t>
+              <a:t>Cài</a:t>
             </a:r>
             <a:r>
               <a:rPr lang="en-US" dirty="0"/>
@@ -5260,7 +5323,7 @@
             </a:r>
             <a:r>
               <a:rPr lang="en-US" dirty="0" err="1"/>
-              <a:t>trúc</a:t>
+              <a:t>đặt</a:t>
             </a:r>
             <a:r>
               <a:rPr lang="en-US" dirty="0"/>
@@ -5268,7 +5331,7 @@
             </a:r>
             <a:r>
               <a:rPr lang="en-US" dirty="0" err="1"/>
-              <a:t>tổng</a:t>
+              <a:t>môi</a:t>
             </a:r>
             <a:r>
               <a:rPr lang="en-US" dirty="0"/>
@@ -5276,7 +5339,50 @@
             </a:r>
             <a:r>
               <a:rPr lang="en-US" dirty="0" err="1"/>
-              <a:t>thể</a:t>
+              <a:t>trường</a:t>
+            </a:r>
+            <a:r>
+              <a:rPr lang="en-US" dirty="0"/>
+              <a:t>.</a:t>
+            </a:r>
+          </a:p>
+        </p:txBody>
+      </p:sp>
+      <p:sp>
+        <p:nvSpPr>
+          <p:cNvPr id="3" name="Content Placeholder 2">
+            <a:extLst>
+              <a:ext uri="{FF2B5EF4-FFF2-40B4-BE49-F238E27FC236}">
+                <a16:creationId xmlns:a16="http://schemas.microsoft.com/office/drawing/2014/main" id="{E531F10E-F86D-44F4-99A0-473BA5A0B87F}"/>
+              </a:ext>
+            </a:extLst>
+          </p:cNvPr>
+          <p:cNvSpPr>
+            <a:spLocks noGrp="1"/>
+          </p:cNvSpPr>
+          <p:nvPr>
+            <p:ph idx="1"/>
+          </p:nvPr>
+        </p:nvSpPr>
+        <p:spPr>
+          <a:xfrm>
+            <a:off x="431755" y="1439187"/>
+            <a:ext cx="8051845" cy="952100"/>
+          </a:xfrm>
+        </p:spPr>
+        <p:txBody>
+          <a:bodyPr>
+            <a:normAutofit fontScale="92500" lnSpcReduction="10000"/>
+          </a:bodyPr>
+          <a:lstStyle/>
+          <a:p>
+            <a:r>
+              <a:rPr lang="en-US" dirty="0"/>
+              <a:t>1 </a:t>
+            </a:r>
+            <a:r>
+              <a:rPr lang="en-US" dirty="0" err="1"/>
+              <a:t>Tải</a:t>
             </a:r>
             <a:r>
               <a:rPr lang="en-US" dirty="0"/>
@@ -5284,12 +5390,108 @@
             </a:r>
             <a:r>
               <a:rPr lang="en-US" dirty="0" err="1"/>
-              <a:t>của</a:t>
+              <a:t>bản</a:t>
             </a:r>
             <a:r>
               <a:rPr lang="en-US" dirty="0"/>
-              <a:t> Flutter.</a:t>
-            </a:r>
+              <a:t> </a:t>
+            </a:r>
+            <a:r>
+              <a:rPr lang="en-US" i="0" dirty="0">
+                <a:effectLst/>
+                <a:latin typeface="Roboto"/>
+              </a:rPr>
+              <a:t>flutter_windows_1.22.6-stable.zip </a:t>
+            </a:r>
+            <a:r>
+              <a:rPr lang="en-US" i="0" dirty="0" err="1">
+                <a:effectLst/>
+                <a:latin typeface="Roboto"/>
+              </a:rPr>
+              <a:t>và</a:t>
+            </a:r>
+            <a:r>
+              <a:rPr lang="en-US" i="0" dirty="0">
+                <a:effectLst/>
+                <a:latin typeface="Roboto"/>
+              </a:rPr>
+              <a:t> </a:t>
+            </a:r>
+            <a:r>
+              <a:rPr lang="en-US" i="0" dirty="0" err="1">
+                <a:effectLst/>
+                <a:latin typeface="Roboto"/>
+              </a:rPr>
+              <a:t>giải</a:t>
+            </a:r>
+            <a:r>
+              <a:rPr lang="en-US" i="0" dirty="0">
+                <a:effectLst/>
+                <a:latin typeface="Roboto"/>
+              </a:rPr>
+              <a:t> </a:t>
+            </a:r>
+            <a:r>
+              <a:rPr lang="en-US" i="0" dirty="0" err="1">
+                <a:effectLst/>
+                <a:latin typeface="Roboto"/>
+              </a:rPr>
+              <a:t>nén</a:t>
+            </a:r>
+            <a:r>
+              <a:rPr lang="en-US" i="0" dirty="0">
+                <a:effectLst/>
+                <a:latin typeface="Roboto"/>
+              </a:rPr>
+              <a:t>.</a:t>
+            </a:r>
+          </a:p>
+          <a:p>
+            <a:r>
+              <a:rPr lang="en-US" dirty="0">
+                <a:latin typeface="Roboto"/>
+              </a:rPr>
+              <a:t>2 </a:t>
+            </a:r>
+            <a:r>
+              <a:rPr lang="en-US" dirty="0" err="1">
+                <a:latin typeface="Roboto"/>
+              </a:rPr>
+              <a:t>Sữ</a:t>
+            </a:r>
+            <a:r>
+              <a:rPr lang="en-US" dirty="0">
+                <a:latin typeface="Roboto"/>
+              </a:rPr>
+              <a:t> </a:t>
+            </a:r>
+            <a:r>
+              <a:rPr lang="en-US" dirty="0" err="1">
+                <a:latin typeface="Roboto"/>
+              </a:rPr>
+              <a:t>dụng</a:t>
+            </a:r>
+            <a:r>
+              <a:rPr lang="en-US" dirty="0">
+                <a:latin typeface="Roboto"/>
+              </a:rPr>
+              <a:t> git </a:t>
+            </a:r>
+            <a:r>
+              <a:rPr lang="en-US" dirty="0" err="1">
+                <a:latin typeface="Roboto"/>
+              </a:rPr>
+              <a:t>bằng</a:t>
+            </a:r>
+            <a:r>
+              <a:rPr lang="en-US" dirty="0">
+                <a:latin typeface="Roboto"/>
+              </a:rPr>
+              <a:t> link: git clone https://github.com/flutter/flutter.git -b stable</a:t>
+            </a:r>
+          </a:p>
+          <a:p>
+            <a:endParaRPr lang="en-US" dirty="0"/>
           </a:p>
         </p:txBody>
       </p:sp>
@@ -5298,7 +5500,7 @@
           <p:cNvPr id="4" name="Date Placeholder 3">
             <a:extLst>
               <a:ext uri="{FF2B5EF4-FFF2-40B4-BE49-F238E27FC236}">
-                <a16:creationId xmlns:a16="http://schemas.microsoft.com/office/drawing/2014/main" id="{CED46226-62C0-4CAC-B976-322AA180ADF9}"/>
+                <a16:creationId xmlns:a16="http://schemas.microsoft.com/office/drawing/2014/main" id="{0A31DBD3-BBB2-4FEB-9F3D-CCA286037B08}"/>
               </a:ext>
             </a:extLst>
           </p:cNvPr>
@@ -5316,7 +5518,7 @@
           <a:p>
             <a:fld id="{7F6D23A5-47A9-D847-BD80-AD3152E19BC3}" type="datetime1">
               <a:rPr lang="en-US" smtClean="0"/>
-              <a:t>2/2/2021</a:t>
+              <a:t>3/3/2021</a:t>
             </a:fld>
             <a:endParaRPr lang="en-US"/>
           </a:p>
@@ -5327,7 +5529,7 @@
           <p:cNvPr id="5" name="Slide Number Placeholder 4">
             <a:extLst>
               <a:ext uri="{FF2B5EF4-FFF2-40B4-BE49-F238E27FC236}">
-                <a16:creationId xmlns:a16="http://schemas.microsoft.com/office/drawing/2014/main" id="{E3BD38C6-4703-4FC7-ADAF-7628D2328718}"/>
+                <a16:creationId xmlns:a16="http://schemas.microsoft.com/office/drawing/2014/main" id="{B09C0625-3FE2-41B7-B299-86C6A6CD37C1}"/>
               </a:ext>
             </a:extLst>
           </p:cNvPr>
@@ -5362,10 +5564,10 @@
       </p:sp>
       <p:pic>
         <p:nvPicPr>
-          <p:cNvPr id="7" name="Picture 6">
-            <a:extLst>
-              <a:ext uri="{FF2B5EF4-FFF2-40B4-BE49-F238E27FC236}">
-                <a16:creationId xmlns:a16="http://schemas.microsoft.com/office/drawing/2014/main" id="{464F1709-6A72-4769-9A6B-CE83439B3869}"/>
+          <p:cNvPr id="10" name="Picture 9">
+            <a:extLst>
+              <a:ext uri="{FF2B5EF4-FFF2-40B4-BE49-F238E27FC236}">
+                <a16:creationId xmlns:a16="http://schemas.microsoft.com/office/drawing/2014/main" id="{7EFE9292-EBB2-4B40-8106-55C08052A22E}"/>
               </a:ext>
             </a:extLst>
           </p:cNvPr>
@@ -5375,7 +5577,7 @@
           <p:nvPr/>
         </p:nvPicPr>
         <p:blipFill>
-          <a:blip r:embed="rId2" cstate="print">
+          <a:blip r:embed="rId2">
             <a:extLst>
               <a:ext uri="{28A0092B-C50C-407E-A947-70E740481C1C}">
                 <a14:useLocalDpi xmlns:a14="http://schemas.microsoft.com/office/drawing/2010/main" val="0"/>
@@ -5388,8 +5590,38 @@
         </p:blipFill>
         <p:spPr>
           <a:xfrm>
-            <a:off x="364487" y="1466850"/>
-            <a:ext cx="8465826" cy="4414795"/>
+            <a:off x="1397000" y="2418027"/>
+            <a:ext cx="1992776" cy="3873093"/>
+          </a:xfrm>
+          <a:prstGeom prst="rect">
+            <a:avLst/>
+          </a:prstGeom>
+        </p:spPr>
+      </p:pic>
+      <p:pic>
+        <p:nvPicPr>
+          <p:cNvPr id="12" name="Picture 11">
+            <a:extLst>
+              <a:ext uri="{FF2B5EF4-FFF2-40B4-BE49-F238E27FC236}">
+                <a16:creationId xmlns:a16="http://schemas.microsoft.com/office/drawing/2014/main" id="{1C0A78A3-63C2-4896-AF2E-4AC826C8A74E}"/>
+              </a:ext>
+            </a:extLst>
+          </p:cNvPr>
+          <p:cNvPicPr>
+            <a:picLocks noChangeAspect="1"/>
+          </p:cNvPicPr>
+          <p:nvPr/>
+        </p:nvPicPr>
+        <p:blipFill>
+          <a:blip r:embed="rId3"/>
+          <a:stretch>
+            <a:fillRect/>
+          </a:stretch>
+        </p:blipFill>
+        <p:spPr>
+          <a:xfrm>
+            <a:off x="4216400" y="2488963"/>
+            <a:ext cx="3699171" cy="3873093"/>
           </a:xfrm>
           <a:prstGeom prst="rect">
             <a:avLst/>
@@ -5399,7 +5631,7 @@
     </p:spTree>
     <p:extLst>
       <p:ext uri="{BB962C8B-B14F-4D97-AF65-F5344CB8AC3E}">
-        <p14:creationId xmlns:p14="http://schemas.microsoft.com/office/powerpoint/2010/main" val="1094976452"/>
+        <p14:creationId xmlns:p14="http://schemas.microsoft.com/office/powerpoint/2010/main" val="655565804"/>
       </p:ext>
     </p:extLst>
   </p:cSld>
@@ -5428,66 +5660,10 @@
       </p:grpSpPr>
       <p:sp>
         <p:nvSpPr>
-          <p:cNvPr id="2" name="Title 1">
-            <a:extLst>
-              <a:ext uri="{FF2B5EF4-FFF2-40B4-BE49-F238E27FC236}">
-                <a16:creationId xmlns:a16="http://schemas.microsoft.com/office/drawing/2014/main" id="{6E26543D-6383-4050-9FFB-E33261ED7F14}"/>
-              </a:ext>
-            </a:extLst>
-          </p:cNvPr>
-          <p:cNvSpPr>
-            <a:spLocks noGrp="1"/>
-          </p:cNvSpPr>
-          <p:nvPr>
-            <p:ph type="title"/>
-          </p:nvPr>
-        </p:nvSpPr>
-        <p:spPr/>
-        <p:txBody>
-          <a:bodyPr/>
-          <a:lstStyle/>
-          <a:p>
-            <a:r>
-              <a:rPr lang="en-US" dirty="0" err="1"/>
-              <a:t>Các</a:t>
-            </a:r>
-            <a:r>
-              <a:rPr lang="en-US" dirty="0"/>
-              <a:t> </a:t>
-            </a:r>
-            <a:r>
-              <a:rPr lang="en-US" dirty="0" err="1"/>
-              <a:t>lớp</a:t>
-            </a:r>
-            <a:r>
-              <a:rPr lang="en-US" dirty="0"/>
-              <a:t> </a:t>
-            </a:r>
-            <a:r>
-              <a:rPr lang="en-US" dirty="0" err="1"/>
-              <a:t>kiến</a:t>
-            </a:r>
-            <a:r>
-              <a:rPr lang="en-US" dirty="0"/>
-              <a:t> </a:t>
-            </a:r>
-            <a:r>
-              <a:rPr lang="en-US" dirty="0" err="1"/>
-              <a:t>trúc</a:t>
-            </a:r>
-            <a:r>
-              <a:rPr lang="en-US" dirty="0"/>
-              <a:t> flutter mobile </a:t>
-            </a:r>
-          </a:p>
-        </p:txBody>
-      </p:sp>
-      <p:sp>
-        <p:nvSpPr>
           <p:cNvPr id="4" name="Date Placeholder 3">
             <a:extLst>
               <a:ext uri="{FF2B5EF4-FFF2-40B4-BE49-F238E27FC236}">
-                <a16:creationId xmlns:a16="http://schemas.microsoft.com/office/drawing/2014/main" id="{C07A4590-6401-4E4A-B2BB-D907B1015D74}"/>
+                <a16:creationId xmlns:a16="http://schemas.microsoft.com/office/drawing/2014/main" id="{91E023E7-9B42-4D4E-835C-5FB34B73FBEB}"/>
               </a:ext>
             </a:extLst>
           </p:cNvPr>
@@ -5505,7 +5681,7 @@
           <a:p>
             <a:fld id="{7F6D23A5-47A9-D847-BD80-AD3152E19BC3}" type="datetime1">
               <a:rPr lang="en-US" smtClean="0"/>
-              <a:t>2/2/2021</a:t>
+              <a:t>3/3/2021</a:t>
             </a:fld>
             <a:endParaRPr lang="en-US"/>
           </a:p>
@@ -5516,7 +5692,7 @@
           <p:cNvPr id="5" name="Slide Number Placeholder 4">
             <a:extLst>
               <a:ext uri="{FF2B5EF4-FFF2-40B4-BE49-F238E27FC236}">
-                <a16:creationId xmlns:a16="http://schemas.microsoft.com/office/drawing/2014/main" id="{80962EB0-EE19-41DA-AD3D-D6BE587FCDA6}"/>
+                <a16:creationId xmlns:a16="http://schemas.microsoft.com/office/drawing/2014/main" id="{E93A18E3-1274-457C-A490-318C63A9E347}"/>
               </a:ext>
             </a:extLst>
           </p:cNvPr>
@@ -5551,43 +5727,208 @@
       </p:sp>
       <p:pic>
         <p:nvPicPr>
-          <p:cNvPr id="11" name="Content Placeholder 10">
-            <a:extLst>
-              <a:ext uri="{FF2B5EF4-FFF2-40B4-BE49-F238E27FC236}">
-                <a16:creationId xmlns:a16="http://schemas.microsoft.com/office/drawing/2014/main" id="{D79B10DD-DB27-44EE-8626-24C98F88F630}"/>
+          <p:cNvPr id="9" name="Picture 8">
+            <a:extLst>
+              <a:ext uri="{FF2B5EF4-FFF2-40B4-BE49-F238E27FC236}">
+                <a16:creationId xmlns:a16="http://schemas.microsoft.com/office/drawing/2014/main" id="{06EE71AB-20C4-4EBF-8835-7470D4F4907A}"/>
               </a:ext>
             </a:extLst>
           </p:cNvPr>
           <p:cNvPicPr>
-            <a:picLocks noGrp="1" noChangeAspect="1"/>
+            <a:picLocks noChangeAspect="1"/>
           </p:cNvPicPr>
-          <p:nvPr>
-            <p:ph idx="1"/>
-          </p:nvPr>
+          <p:nvPr/>
         </p:nvPicPr>
         <p:blipFill>
-          <a:blip r:embed="rId2">
-            <a:extLst>
-              <a:ext uri="{28A0092B-C50C-407E-A947-70E740481C1C}">
-                <a14:useLocalDpi xmlns:a14="http://schemas.microsoft.com/office/drawing/2010/main" val="0"/>
-              </a:ext>
-            </a:extLst>
-          </a:blip>
+          <a:blip r:embed="rId2"/>
           <a:stretch>
             <a:fillRect/>
           </a:stretch>
         </p:blipFill>
         <p:spPr>
           <a:xfrm>
-            <a:off x="456628" y="1543050"/>
-            <a:ext cx="8281543" cy="4648199"/>
+            <a:off x="4514320" y="1421759"/>
+            <a:ext cx="4321952" cy="4769491"/>
           </a:xfrm>
+          <a:prstGeom prst="rect">
+            <a:avLst/>
+          </a:prstGeom>
         </p:spPr>
       </p:pic>
+      <p:pic>
+        <p:nvPicPr>
+          <p:cNvPr id="11" name="Picture 10">
+            <a:extLst>
+              <a:ext uri="{FF2B5EF4-FFF2-40B4-BE49-F238E27FC236}">
+                <a16:creationId xmlns:a16="http://schemas.microsoft.com/office/drawing/2014/main" id="{AB1E4C7A-4FB1-4D49-9AE4-194650F5CD1B}"/>
+              </a:ext>
+            </a:extLst>
+          </p:cNvPr>
+          <p:cNvPicPr>
+            <a:picLocks noChangeAspect="1"/>
+          </p:cNvPicPr>
+          <p:nvPr/>
+        </p:nvPicPr>
+        <p:blipFill>
+          <a:blip r:embed="rId3"/>
+          <a:stretch>
+            <a:fillRect/>
+          </a:stretch>
+        </p:blipFill>
+        <p:spPr>
+          <a:xfrm>
+            <a:off x="330099" y="1415642"/>
+            <a:ext cx="4114901" cy="4769490"/>
+          </a:xfrm>
+          <a:prstGeom prst="rect">
+            <a:avLst/>
+          </a:prstGeom>
+        </p:spPr>
+      </p:pic>
+      <p:sp>
+        <p:nvSpPr>
+          <p:cNvPr id="14" name="Rectangle 1">
+            <a:extLst>
+              <a:ext uri="{FF2B5EF4-FFF2-40B4-BE49-F238E27FC236}">
+                <a16:creationId xmlns:a16="http://schemas.microsoft.com/office/drawing/2014/main" id="{A31068F4-4045-4A56-A0B0-67F5786ADAE5}"/>
+              </a:ext>
+            </a:extLst>
+          </p:cNvPr>
+          <p:cNvSpPr>
+            <a:spLocks noChangeArrowheads="1"/>
+          </p:cNvSpPr>
+          <p:nvPr/>
+        </p:nvSpPr>
+        <p:spPr bwMode="auto">
+          <a:xfrm>
+            <a:off x="1778000" y="659513"/>
+            <a:ext cx="6784658" cy="553998"/>
+          </a:xfrm>
+          <a:prstGeom prst="rect">
+            <a:avLst/>
+          </a:prstGeom>
+          <a:solidFill>
+            <a:srgbClr val="F8F9FA"/>
+          </a:solidFill>
+          <a:ln>
+            <a:noFill/>
+          </a:ln>
+          <a:effectLst/>
+          <a:extLst>
+            <a:ext uri="{91240B29-F687-4F45-9708-019B960494DF}">
+              <a14:hiddenLine xmlns:a14="http://schemas.microsoft.com/office/drawing/2010/main" w="9525">
+                <a:solidFill>
+                  <a:schemeClr val="tx1"/>
+                </a:solidFill>
+                <a:miter lim="800000"/>
+                <a:headEnd/>
+                <a:tailEnd/>
+              </a14:hiddenLine>
+            </a:ext>
+            <a:ext uri="{AF507438-7753-43E0-B8FC-AC1667EBCBE1}">
+              <a14:hiddenEffects xmlns:a14="http://schemas.microsoft.com/office/drawing/2010/main">
+                <a:effectLst>
+                  <a:outerShdw dist="35921" dir="2700000" algn="ctr" rotWithShape="0">
+                    <a:schemeClr val="bg2"/>
+                  </a:outerShdw>
+                </a:effectLst>
+              </a14:hiddenEffects>
+            </a:ext>
+          </a:extLst>
+        </p:spPr>
+        <p:txBody>
+          <a:bodyPr vert="horz" wrap="square" lIns="91440" tIns="0" rIns="91440" bIns="0" numCol="1" anchor="ctr" anchorCtr="0" compatLnSpc="1">
+            <a:prstTxWarp prst="textNoShape">
+              <a:avLst/>
+            </a:prstTxWarp>
+            <a:spAutoFit/>
+          </a:bodyPr>
+          <a:lstStyle/>
+          <a:p>
+            <a:pPr marL="0" marR="0" lvl="0" indent="0" algn="l" defTabSz="914400" rtl="0" eaLnBrk="0" fontAlgn="base" latinLnBrk="0" hangingPunct="0">
+              <a:lnSpc>
+                <a:spcPct val="100000"/>
+              </a:lnSpc>
+              <a:spcBef>
+                <a:spcPct val="0"/>
+              </a:spcBef>
+              <a:spcAft>
+                <a:spcPct val="0"/>
+              </a:spcAft>
+              <a:buClrTx/>
+              <a:buSzTx/>
+              <a:buFontTx/>
+              <a:buNone/>
+              <a:tabLst/>
+            </a:pPr>
+            <a:r>
+              <a:rPr kumimoji="0" lang="en-US" altLang="en-US" sz="3600" b="0" i="0" u="none" strike="noStrike" cap="none" normalizeH="0" baseline="0" dirty="0">
+                <a:ln>
+                  <a:noFill/>
+                </a:ln>
+                <a:solidFill>
+                  <a:srgbClr val="1FBAAC"/>
+                </a:solidFill>
+                <a:effectLst/>
+                <a:latin typeface="Roboto Mono"/>
+              </a:rPr>
+              <a:t>C</a:t>
+            </a:r>
+            <a:r>
+              <a:rPr kumimoji="0" lang="en-US" altLang="en-US" sz="3600" b="0" i="0" u="none" strike="noStrike" cap="none" normalizeH="0" baseline="0" dirty="0">
+                <a:ln>
+                  <a:noFill/>
+                </a:ln>
+                <a:solidFill>
+                  <a:srgbClr val="212529"/>
+                </a:solidFill>
+                <a:effectLst/>
+                <a:latin typeface="Roboto Mono"/>
+              </a:rPr>
+              <a:t>:\src\flutter&gt;flutter </a:t>
+            </a:r>
+            <a:r>
+              <a:rPr kumimoji="0" lang="en-US" altLang="en-US" sz="3600" b="0" i="0" u="none" strike="noStrike" cap="none" normalizeH="0" baseline="0" dirty="0">
+                <a:ln>
+                  <a:noFill/>
+                </a:ln>
+                <a:solidFill>
+                  <a:srgbClr val="1FBAAC"/>
+                </a:solidFill>
+                <a:effectLst/>
+                <a:latin typeface="Roboto Mono"/>
+              </a:rPr>
+              <a:t>doctor</a:t>
+            </a:r>
+            <a:r>
+              <a:rPr kumimoji="0" lang="en-US" altLang="en-US" sz="2000" b="0" i="0" u="none" strike="noStrike" cap="none" normalizeH="0" baseline="0" dirty="0">
+                <a:ln>
+                  <a:noFill/>
+                </a:ln>
+                <a:solidFill>
+                  <a:schemeClr val="tx1"/>
+                </a:solidFill>
+                <a:effectLst/>
+              </a:rPr>
+              <a:t> </a:t>
+            </a:r>
+            <a:endParaRPr kumimoji="0" lang="en-US" altLang="en-US" sz="6600" b="0" i="0" u="none" strike="noStrike" cap="none" normalizeH="0" baseline="0" dirty="0">
+              <a:ln>
+                <a:noFill/>
+              </a:ln>
+              <a:solidFill>
+                <a:schemeClr val="tx1"/>
+              </a:solidFill>
+              <a:effectLst/>
+              <a:latin typeface="Arial" panose="020B0604020202020204" pitchFamily="34" charset="0"/>
+            </a:endParaRPr>
+          </a:p>
+        </p:txBody>
+      </p:sp>
     </p:spTree>
     <p:extLst>
       <p:ext uri="{BB962C8B-B14F-4D97-AF65-F5344CB8AC3E}">
-        <p14:creationId xmlns:p14="http://schemas.microsoft.com/office/powerpoint/2010/main" val="2119243120"/>
+        <p14:creationId xmlns:p14="http://schemas.microsoft.com/office/powerpoint/2010/main" val="2182443832"/>
       </p:ext>
     </p:extLst>
   </p:cSld>
@@ -5619,7 +5960,7 @@
           <p:cNvPr id="2" name="Title 1">
             <a:extLst>
               <a:ext uri="{FF2B5EF4-FFF2-40B4-BE49-F238E27FC236}">
-                <a16:creationId xmlns:a16="http://schemas.microsoft.com/office/drawing/2014/main" id="{B375808D-C841-490F-8DE7-E337BE5A60BA}"/>
+                <a16:creationId xmlns:a16="http://schemas.microsoft.com/office/drawing/2014/main" id="{AAD5882E-3763-4E63-B9A8-5CC6578CA935}"/>
               </a:ext>
             </a:extLst>
           </p:cNvPr>
@@ -5632,58 +5973,115 @@
         </p:nvSpPr>
         <p:spPr/>
         <p:txBody>
+          <a:bodyPr>
+            <a:normAutofit fontScale="90000"/>
+          </a:bodyPr>
+          <a:lstStyle/>
+          <a:p>
+            <a:r>
+              <a:rPr lang="en-US" dirty="0"/>
+              <a:t>III. </a:t>
+            </a:r>
+            <a:r>
+              <a:rPr lang="en-US" b="1" dirty="0" err="1"/>
+              <a:t>Cài</a:t>
+            </a:r>
+            <a:r>
+              <a:rPr lang="en-US" b="1" dirty="0"/>
+              <a:t> </a:t>
+            </a:r>
+            <a:r>
+              <a:rPr lang="en-US" b="1" dirty="0" err="1"/>
+              <a:t>đặt</a:t>
+            </a:r>
+            <a:r>
+              <a:rPr lang="en-US" b="1" dirty="0"/>
+              <a:t> Plugins </a:t>
+            </a:r>
+            <a:r>
+              <a:rPr lang="en-US" b="1" dirty="0" err="1"/>
+              <a:t>trên</a:t>
+            </a:r>
+            <a:r>
+              <a:rPr lang="en-US" b="1" dirty="0"/>
+              <a:t> IDE Android Studio</a:t>
+            </a:r>
+          </a:p>
+        </p:txBody>
+      </p:sp>
+      <p:sp>
+        <p:nvSpPr>
+          <p:cNvPr id="4" name="Date Placeholder 3">
+            <a:extLst>
+              <a:ext uri="{FF2B5EF4-FFF2-40B4-BE49-F238E27FC236}">
+                <a16:creationId xmlns:a16="http://schemas.microsoft.com/office/drawing/2014/main" id="{ACFF69F2-3322-4DDF-A24B-997AB4DC290D}"/>
+              </a:ext>
+            </a:extLst>
+          </p:cNvPr>
+          <p:cNvSpPr>
+            <a:spLocks noGrp="1"/>
+          </p:cNvSpPr>
+          <p:nvPr>
+            <p:ph type="dt" sz="half" idx="10"/>
+          </p:nvPr>
+        </p:nvSpPr>
+        <p:spPr/>
+        <p:txBody>
           <a:bodyPr/>
           <a:lstStyle/>
           <a:p>
-            <a:r>
-              <a:rPr lang="en-US" dirty="0" err="1"/>
-              <a:t>Các</a:t>
-            </a:r>
-            <a:r>
-              <a:rPr lang="en-US" dirty="0"/>
-              <a:t> </a:t>
-            </a:r>
-            <a:r>
-              <a:rPr lang="en-US" dirty="0" err="1"/>
-              <a:t>lớp</a:t>
-            </a:r>
-            <a:r>
-              <a:rPr lang="en-US" dirty="0"/>
-              <a:t> </a:t>
-            </a:r>
-            <a:r>
-              <a:rPr lang="en-US" dirty="0" err="1"/>
-              <a:t>kiến</a:t>
-            </a:r>
-            <a:r>
-              <a:rPr lang="en-US" dirty="0"/>
-              <a:t> </a:t>
-            </a:r>
-            <a:r>
-              <a:rPr lang="en-US" dirty="0" err="1"/>
-              <a:t>trúc</a:t>
-            </a:r>
-            <a:r>
-              <a:rPr lang="en-US" dirty="0"/>
-              <a:t> </a:t>
-            </a:r>
-            <a:r>
-              <a:rPr lang="en-US" dirty="0" err="1"/>
-              <a:t>của</a:t>
-            </a:r>
-            <a:r>
-              <a:rPr lang="en-US" dirty="0"/>
-              <a:t> flutter web</a:t>
-            </a:r>
+            <a:fld id="{7F6D23A5-47A9-D847-BD80-AD3152E19BC3}" type="datetime1">
+              <a:rPr lang="en-US" smtClean="0"/>
+              <a:t>3/3/2021</a:t>
+            </a:fld>
+            <a:endParaRPr lang="en-US"/>
+          </a:p>
+        </p:txBody>
+      </p:sp>
+      <p:sp>
+        <p:nvSpPr>
+          <p:cNvPr id="5" name="Slide Number Placeholder 4">
+            <a:extLst>
+              <a:ext uri="{FF2B5EF4-FFF2-40B4-BE49-F238E27FC236}">
+                <a16:creationId xmlns:a16="http://schemas.microsoft.com/office/drawing/2014/main" id="{ED9D2476-B58E-4ACD-B13E-E702878E3DAA}"/>
+              </a:ext>
+            </a:extLst>
+          </p:cNvPr>
+          <p:cNvSpPr>
+            <a:spLocks noGrp="1"/>
+          </p:cNvSpPr>
+          <p:nvPr>
+            <p:ph type="sldNum" sz="quarter" idx="12"/>
+          </p:nvPr>
+        </p:nvSpPr>
+        <p:spPr/>
+        <p:txBody>
+          <a:bodyPr/>
+          <a:lstStyle/>
+          <a:p>
+            <a:pPr marL="43180">
+              <a:lnSpc>
+                <a:spcPts val="1240"/>
+              </a:lnSpc>
+            </a:pPr>
+            <a:r>
+              <a:rPr lang="en-GB" spc="-165"/>
+              <a:t>1-</a:t>
+            </a:r>
+            <a:fld id="{81D60167-4931-47E6-BA6A-407CBD079E47}" type="slidenum">
+              <a:rPr spc="-165" smtClean="0"/>
+              <a:t>5</a:t>
+            </a:fld>
+            <a:endParaRPr spc="-165" dirty="0"/>
           </a:p>
         </p:txBody>
       </p:sp>
       <p:pic>
         <p:nvPicPr>
-          <p:cNvPr id="7" name="Content Placeholder 6">
-            <a:extLst>
-              <a:ext uri="{FF2B5EF4-FFF2-40B4-BE49-F238E27FC236}">
-                <a16:creationId xmlns:a16="http://schemas.microsoft.com/office/drawing/2014/main" id="{C400262D-AE5C-4EA6-90EC-E0F4E9E6861D}"/>
+          <p:cNvPr id="15" name="Content Placeholder 14">
+            <a:extLst>
+              <a:ext uri="{FF2B5EF4-FFF2-40B4-BE49-F238E27FC236}">
+                <a16:creationId xmlns:a16="http://schemas.microsoft.com/office/drawing/2014/main" id="{BF6C820D-1EB1-451B-9CCE-3CF467B2CB32}"/>
               </a:ext>
             </a:extLst>
           </p:cNvPr>
@@ -5708,82 +6106,45 @@
         </p:blipFill>
         <p:spPr>
           <a:xfrm>
-            <a:off x="411956" y="1847850"/>
-            <a:ext cx="8370888" cy="3423450"/>
+            <a:off x="330200" y="1390650"/>
+            <a:ext cx="3954860" cy="4892675"/>
           </a:xfrm>
         </p:spPr>
       </p:pic>
-      <p:sp>
-        <p:nvSpPr>
-          <p:cNvPr id="4" name="Date Placeholder 3">
-            <a:extLst>
-              <a:ext uri="{FF2B5EF4-FFF2-40B4-BE49-F238E27FC236}">
-                <a16:creationId xmlns:a16="http://schemas.microsoft.com/office/drawing/2014/main" id="{61B51F58-5BEB-4035-A69D-215A54D805D6}"/>
-              </a:ext>
-            </a:extLst>
-          </p:cNvPr>
-          <p:cNvSpPr>
-            <a:spLocks noGrp="1"/>
-          </p:cNvSpPr>
-          <p:nvPr>
-            <p:ph type="dt" sz="half" idx="10"/>
-          </p:nvPr>
-        </p:nvSpPr>
-        <p:spPr/>
-        <p:txBody>
-          <a:bodyPr/>
-          <a:lstStyle/>
-          <a:p>
-            <a:fld id="{7F6D23A5-47A9-D847-BD80-AD3152E19BC3}" type="datetime1">
-              <a:rPr lang="en-US" smtClean="0"/>
-              <a:t>2/2/2021</a:t>
-            </a:fld>
-            <a:endParaRPr lang="en-US"/>
-          </a:p>
-        </p:txBody>
-      </p:sp>
-      <p:sp>
-        <p:nvSpPr>
-          <p:cNvPr id="5" name="Slide Number Placeholder 4">
-            <a:extLst>
-              <a:ext uri="{FF2B5EF4-FFF2-40B4-BE49-F238E27FC236}">
-                <a16:creationId xmlns:a16="http://schemas.microsoft.com/office/drawing/2014/main" id="{F7F8B79D-4CED-4A0D-AC17-135F40F14B74}"/>
-              </a:ext>
-            </a:extLst>
-          </p:cNvPr>
-          <p:cNvSpPr>
-            <a:spLocks noGrp="1"/>
-          </p:cNvSpPr>
-          <p:nvPr>
-            <p:ph type="sldNum" sz="quarter" idx="12"/>
-          </p:nvPr>
-        </p:nvSpPr>
-        <p:spPr/>
-        <p:txBody>
-          <a:bodyPr/>
-          <a:lstStyle/>
-          <a:p>
-            <a:pPr marL="43180">
-              <a:lnSpc>
-                <a:spcPts val="1240"/>
-              </a:lnSpc>
-            </a:pPr>
-            <a:r>
-              <a:rPr lang="en-GB" spc="-165"/>
-              <a:t>1-</a:t>
-            </a:r>
-            <a:fld id="{81D60167-4931-47E6-BA6A-407CBD079E47}" type="slidenum">
-              <a:rPr spc="-165" smtClean="0"/>
-              <a:t>5</a:t>
-            </a:fld>
-            <a:endParaRPr spc="-165" dirty="0"/>
-          </a:p>
-        </p:txBody>
-      </p:sp>
+      <p:pic>
+        <p:nvPicPr>
+          <p:cNvPr id="8" name="Picture 7">
+            <a:extLst>
+              <a:ext uri="{FF2B5EF4-FFF2-40B4-BE49-F238E27FC236}">
+                <a16:creationId xmlns:a16="http://schemas.microsoft.com/office/drawing/2014/main" id="{500A828F-359A-4134-A257-B340CEF39DCD}"/>
+              </a:ext>
+            </a:extLst>
+          </p:cNvPr>
+          <p:cNvPicPr>
+            <a:picLocks noChangeAspect="1"/>
+          </p:cNvPicPr>
+          <p:nvPr/>
+        </p:nvPicPr>
+        <p:blipFill>
+          <a:blip r:embed="rId3"/>
+          <a:stretch>
+            <a:fillRect/>
+          </a:stretch>
+        </p:blipFill>
+        <p:spPr>
+          <a:xfrm>
+            <a:off x="4521199" y="1319255"/>
+            <a:ext cx="4041457" cy="5161700"/>
+          </a:xfrm>
+          <a:prstGeom prst="rect">
+            <a:avLst/>
+          </a:prstGeom>
+        </p:spPr>
+      </p:pic>
     </p:spTree>
     <p:extLst>
       <p:ext uri="{BB962C8B-B14F-4D97-AF65-F5344CB8AC3E}">
-        <p14:creationId xmlns:p14="http://schemas.microsoft.com/office/powerpoint/2010/main" val="3914187766"/>
+        <p14:creationId xmlns:p14="http://schemas.microsoft.com/office/powerpoint/2010/main" val="2419763643"/>
       </p:ext>
     </p:extLst>
   </p:cSld>
@@ -5810,76 +6171,12 @@
           <a:chExt cx="0" cy="0"/>
         </a:xfrm>
       </p:grpSpPr>
-      <p:sp>
-        <p:nvSpPr>
-          <p:cNvPr id="2" name="Title 1">
-            <a:extLst>
-              <a:ext uri="{FF2B5EF4-FFF2-40B4-BE49-F238E27FC236}">
-                <a16:creationId xmlns:a16="http://schemas.microsoft.com/office/drawing/2014/main" id="{1CE1D889-E264-4D57-944F-D123D0980DBC}"/>
-              </a:ext>
-            </a:extLst>
-          </p:cNvPr>
-          <p:cNvSpPr>
-            <a:spLocks noGrp="1"/>
-          </p:cNvSpPr>
-          <p:nvPr>
-            <p:ph type="title"/>
-          </p:nvPr>
-        </p:nvSpPr>
-        <p:spPr/>
-        <p:txBody>
-          <a:bodyPr/>
-          <a:lstStyle/>
-          <a:p>
-            <a:r>
-              <a:rPr lang="en-US" dirty="0" err="1"/>
-              <a:t>Ưu</a:t>
-            </a:r>
-            <a:r>
-              <a:rPr lang="en-US" dirty="0"/>
-              <a:t> </a:t>
-            </a:r>
-            <a:r>
-              <a:rPr lang="en-US" dirty="0" err="1"/>
-              <a:t>và</a:t>
-            </a:r>
-            <a:r>
-              <a:rPr lang="en-US" dirty="0"/>
-              <a:t> </a:t>
-            </a:r>
-            <a:r>
-              <a:rPr lang="en-US" dirty="0" err="1"/>
-              <a:t>nhược</a:t>
-            </a:r>
-            <a:r>
-              <a:rPr lang="en-US" dirty="0"/>
-              <a:t> </a:t>
-            </a:r>
-            <a:r>
-              <a:rPr lang="en-US" dirty="0" err="1"/>
-              <a:t>điểm</a:t>
-            </a:r>
-            <a:r>
-              <a:rPr lang="en-US" dirty="0"/>
-              <a:t> </a:t>
-            </a:r>
-            <a:r>
-              <a:rPr lang="en-US" dirty="0" err="1"/>
-              <a:t>của</a:t>
-            </a:r>
-            <a:r>
-              <a:rPr lang="en-US" dirty="0"/>
-              <a:t> Flutter.</a:t>
-            </a:r>
-          </a:p>
-        </p:txBody>
-      </p:sp>
       <p:pic>
         <p:nvPicPr>
           <p:cNvPr id="7" name="Content Placeholder 6">
             <a:extLst>
               <a:ext uri="{FF2B5EF4-FFF2-40B4-BE49-F238E27FC236}">
-                <a16:creationId xmlns:a16="http://schemas.microsoft.com/office/drawing/2014/main" id="{6904E8C3-6EB3-46D8-8412-302BE23AB6E7}"/>
+                <a16:creationId xmlns:a16="http://schemas.microsoft.com/office/drawing/2014/main" id="{151E5E73-CC4D-4120-B8F0-155DCE64A485}"/>
               </a:ext>
             </a:extLst>
           </p:cNvPr>
@@ -5891,21 +6188,15 @@
           </p:nvPr>
         </p:nvPicPr>
         <p:blipFill>
-          <a:blip r:embed="rId2" cstate="print">
-            <a:extLst>
-              <a:ext uri="{28A0092B-C50C-407E-A947-70E740481C1C}">
-                <a14:useLocalDpi xmlns:a14="http://schemas.microsoft.com/office/drawing/2010/main" val="0"/>
-              </a:ext>
-            </a:extLst>
-          </a:blip>
+          <a:blip r:embed="rId2"/>
           <a:stretch>
             <a:fillRect/>
           </a:stretch>
         </p:blipFill>
         <p:spPr>
           <a:xfrm>
-            <a:off x="431800" y="1703557"/>
-            <a:ext cx="8370888" cy="4365287"/>
+            <a:off x="2006600" y="1085850"/>
+            <a:ext cx="4972050" cy="1781175"/>
           </a:xfrm>
         </p:spPr>
       </p:pic>
@@ -5914,7 +6205,7 @@
           <p:cNvPr id="4" name="Date Placeholder 3">
             <a:extLst>
               <a:ext uri="{FF2B5EF4-FFF2-40B4-BE49-F238E27FC236}">
-                <a16:creationId xmlns:a16="http://schemas.microsoft.com/office/drawing/2014/main" id="{658B881E-451D-4A56-902F-3EF3127A9314}"/>
+                <a16:creationId xmlns:a16="http://schemas.microsoft.com/office/drawing/2014/main" id="{F94F3310-EE18-46C9-BE0C-29BB60EFA7F1}"/>
               </a:ext>
             </a:extLst>
           </p:cNvPr>
@@ -5932,7 +6223,7 @@
           <a:p>
             <a:fld id="{7F6D23A5-47A9-D847-BD80-AD3152E19BC3}" type="datetime1">
               <a:rPr lang="en-US" smtClean="0"/>
-              <a:t>2/2/2021</a:t>
+              <a:t>3/3/2021</a:t>
             </a:fld>
             <a:endParaRPr lang="en-US"/>
           </a:p>
@@ -5943,7 +6234,7 @@
           <p:cNvPr id="5" name="Slide Number Placeholder 4">
             <a:extLst>
               <a:ext uri="{FF2B5EF4-FFF2-40B4-BE49-F238E27FC236}">
-                <a16:creationId xmlns:a16="http://schemas.microsoft.com/office/drawing/2014/main" id="{4C0D8442-4B07-4AF8-BDD0-9F9F030C35C2}"/>
+                <a16:creationId xmlns:a16="http://schemas.microsoft.com/office/drawing/2014/main" id="{EC43EDCD-DA1C-49EF-9316-724B18A65A7E}"/>
               </a:ext>
             </a:extLst>
           </p:cNvPr>
@@ -5976,10 +6267,40 @@
           </a:p>
         </p:txBody>
       </p:sp>
+      <p:pic>
+        <p:nvPicPr>
+          <p:cNvPr id="9" name="Picture 8">
+            <a:extLst>
+              <a:ext uri="{FF2B5EF4-FFF2-40B4-BE49-F238E27FC236}">
+                <a16:creationId xmlns:a16="http://schemas.microsoft.com/office/drawing/2014/main" id="{1087A9D3-112D-4404-843F-C34C5A6D45CB}"/>
+              </a:ext>
+            </a:extLst>
+          </p:cNvPr>
+          <p:cNvPicPr>
+            <a:picLocks noChangeAspect="1"/>
+          </p:cNvPicPr>
+          <p:nvPr/>
+        </p:nvPicPr>
+        <p:blipFill>
+          <a:blip r:embed="rId3"/>
+          <a:stretch>
+            <a:fillRect/>
+          </a:stretch>
+        </p:blipFill>
+        <p:spPr>
+          <a:xfrm>
+            <a:off x="434975" y="3219450"/>
+            <a:ext cx="8324850" cy="3228975"/>
+          </a:xfrm>
+          <a:prstGeom prst="rect">
+            <a:avLst/>
+          </a:prstGeom>
+        </p:spPr>
+      </p:pic>
     </p:spTree>
     <p:extLst>
       <p:ext uri="{BB962C8B-B14F-4D97-AF65-F5344CB8AC3E}">
-        <p14:creationId xmlns:p14="http://schemas.microsoft.com/office/powerpoint/2010/main" val="3886687155"/>
+        <p14:creationId xmlns:p14="http://schemas.microsoft.com/office/powerpoint/2010/main" val="3165577653"/>
       </p:ext>
     </p:extLst>
   </p:cSld>
@@ -6011,7 +6332,7 @@
           <p:cNvPr id="2" name="Title 1">
             <a:extLst>
               <a:ext uri="{FF2B5EF4-FFF2-40B4-BE49-F238E27FC236}">
-                <a16:creationId xmlns:a16="http://schemas.microsoft.com/office/drawing/2014/main" id="{ECA30B2C-253C-45BF-92E4-4871557823BA}"/>
+                <a16:creationId xmlns:a16="http://schemas.microsoft.com/office/drawing/2014/main" id="{C29A28C2-B404-452E-8BFA-44202CCA892C}"/>
               </a:ext>
             </a:extLst>
           </p:cNvPr>
@@ -6024,34 +6345,71 @@
         </p:nvSpPr>
         <p:spPr/>
         <p:txBody>
-          <a:bodyPr/>
-          <a:lstStyle/>
-          <a:p>
-            <a:r>
-              <a:rPr lang="en-US" dirty="0" err="1"/>
-              <a:t>Thống</a:t>
-            </a:r>
-            <a:r>
-              <a:rPr lang="en-US" dirty="0"/>
+          <a:bodyPr>
+            <a:normAutofit fontScale="90000"/>
+          </a:bodyPr>
+          <a:lstStyle/>
+          <a:p>
+            <a:r>
+              <a:rPr lang="en-US" b="1" dirty="0"/>
+              <a:t>IV. </a:t>
+            </a:r>
+            <a:r>
+              <a:rPr lang="en-US" b="1" dirty="0" err="1"/>
+              <a:t>Tạo</a:t>
+            </a:r>
+            <a:r>
+              <a:rPr lang="en-US" b="1" dirty="0"/>
               <a:t> </a:t>
             </a:r>
             <a:r>
-              <a:rPr lang="en-US" dirty="0" err="1"/>
-              <a:t>kê</a:t>
-            </a:r>
-            <a:r>
-              <a:rPr lang="en-US" dirty="0"/>
-              <a:t> flutter </a:t>
-            </a:r>
-            <a:r>
-              <a:rPr lang="en-US" dirty="0" err="1"/>
-              <a:t>năm</a:t>
-            </a:r>
-            <a:r>
-              <a:rPr lang="en-US"/>
-              <a:t> 2020</a:t>
-            </a:r>
-            <a:endParaRPr lang="en-US" dirty="0"/>
+              <a:rPr lang="en-US" b="1" dirty="0" err="1"/>
+              <a:t>dự</a:t>
+            </a:r>
+            <a:r>
+              <a:rPr lang="en-US" b="1" dirty="0"/>
+              <a:t> </a:t>
+            </a:r>
+            <a:r>
+              <a:rPr lang="en-US" b="1" dirty="0" err="1"/>
+              <a:t>án</a:t>
+            </a:r>
+            <a:r>
+              <a:rPr lang="en-US" b="1" dirty="0"/>
+              <a:t> Flutter </a:t>
+            </a:r>
+            <a:r>
+              <a:rPr lang="en-US" b="1" dirty="0" err="1"/>
+              <a:t>và</a:t>
+            </a:r>
+            <a:r>
+              <a:rPr lang="en-US" b="1" dirty="0"/>
+              <a:t> </a:t>
+            </a:r>
+            <a:r>
+              <a:rPr lang="en-US" b="1" dirty="0" err="1"/>
+              <a:t>tạo</a:t>
+            </a:r>
+            <a:r>
+              <a:rPr lang="en-US" b="1" dirty="0"/>
+              <a:t> </a:t>
+            </a:r>
+            <a:r>
+              <a:rPr lang="en-US" b="1" dirty="0" err="1"/>
+              <a:t>máy</a:t>
+            </a:r>
+            <a:r>
+              <a:rPr lang="en-US" b="1" dirty="0"/>
+              <a:t> </a:t>
+            </a:r>
+            <a:r>
+              <a:rPr lang="en-US" b="1" dirty="0" err="1"/>
+              <a:t>ảo</a:t>
+            </a:r>
+            <a:r>
+              <a:rPr lang="en-US" b="1" dirty="0"/>
+              <a:t> Android.</a:t>
+            </a:r>
           </a:p>
         </p:txBody>
       </p:sp>
@@ -6060,7 +6418,7 @@
           <p:cNvPr id="7" name="Content Placeholder 6">
             <a:extLst>
               <a:ext uri="{FF2B5EF4-FFF2-40B4-BE49-F238E27FC236}">
-                <a16:creationId xmlns:a16="http://schemas.microsoft.com/office/drawing/2014/main" id="{420B2602-2DEC-4CC6-94A7-8E3CAC2E2501}"/>
+                <a16:creationId xmlns:a16="http://schemas.microsoft.com/office/drawing/2014/main" id="{C6611E43-F34F-4955-9F2B-F32F3553D148}"/>
               </a:ext>
             </a:extLst>
           </p:cNvPr>
@@ -6072,21 +6430,15 @@
           </p:nvPr>
         </p:nvPicPr>
         <p:blipFill>
-          <a:blip r:embed="rId2" cstate="print">
-            <a:extLst>
-              <a:ext uri="{28A0092B-C50C-407E-A947-70E740481C1C}">
-                <a14:useLocalDpi xmlns:a14="http://schemas.microsoft.com/office/drawing/2010/main" val="0"/>
-              </a:ext>
-            </a:extLst>
-          </a:blip>
+          <a:blip r:embed="rId2"/>
           <a:stretch>
             <a:fillRect/>
           </a:stretch>
         </p:blipFill>
         <p:spPr>
           <a:xfrm>
-            <a:off x="431800" y="1703557"/>
-            <a:ext cx="8370888" cy="4365287"/>
+            <a:off x="1224033" y="1439863"/>
+            <a:ext cx="6786421" cy="4892675"/>
           </a:xfrm>
         </p:spPr>
       </p:pic>
@@ -6095,7 +6447,7 @@
           <p:cNvPr id="4" name="Date Placeholder 3">
             <a:extLst>
               <a:ext uri="{FF2B5EF4-FFF2-40B4-BE49-F238E27FC236}">
-                <a16:creationId xmlns:a16="http://schemas.microsoft.com/office/drawing/2014/main" id="{E52636B3-2466-4DE5-BD29-CF7E69977F9D}"/>
+                <a16:creationId xmlns:a16="http://schemas.microsoft.com/office/drawing/2014/main" id="{A91A68C1-8651-4059-8062-035A5378D263}"/>
               </a:ext>
             </a:extLst>
           </p:cNvPr>
@@ -6113,7 +6465,7 @@
           <a:p>
             <a:fld id="{7F6D23A5-47A9-D847-BD80-AD3152E19BC3}" type="datetime1">
               <a:rPr lang="en-US" smtClean="0"/>
-              <a:t>2/2/2021</a:t>
+              <a:t>3/3/2021</a:t>
             </a:fld>
             <a:endParaRPr lang="en-US"/>
           </a:p>
@@ -6124,7 +6476,7 @@
           <p:cNvPr id="5" name="Slide Number Placeholder 4">
             <a:extLst>
               <a:ext uri="{FF2B5EF4-FFF2-40B4-BE49-F238E27FC236}">
-                <a16:creationId xmlns:a16="http://schemas.microsoft.com/office/drawing/2014/main" id="{DDC864B0-C3EB-4006-B79E-1662A2ED3581}"/>
+                <a16:creationId xmlns:a16="http://schemas.microsoft.com/office/drawing/2014/main" id="{4E828769-EE9E-4FFB-B9CC-75758A2EBCCA}"/>
               </a:ext>
             </a:extLst>
           </p:cNvPr>
@@ -6160,7 +6512,309 @@
     </p:spTree>
     <p:extLst>
       <p:ext uri="{BB962C8B-B14F-4D97-AF65-F5344CB8AC3E}">
-        <p14:creationId xmlns:p14="http://schemas.microsoft.com/office/powerpoint/2010/main" val="1191085659"/>
+        <p14:creationId xmlns:p14="http://schemas.microsoft.com/office/powerpoint/2010/main" val="3611166074"/>
+      </p:ext>
+    </p:extLst>
+  </p:cSld>
+  <p:clrMapOvr>
+    <a:masterClrMapping/>
+  </p:clrMapOvr>
+</p:sld>
+</file>
+
+<file path=ppt/slides/slide8.xml><?xml version="1.0" encoding="utf-8"?>
+<p:sld xmlns:a="http://schemas.openxmlformats.org/drawingml/2006/main" xmlns:r="http://schemas.openxmlformats.org/officeDocument/2006/relationships" xmlns:p="http://schemas.openxmlformats.org/presentationml/2006/main">
+  <p:cSld>
+    <p:spTree>
+      <p:nvGrpSpPr>
+        <p:cNvPr id="1" name=""/>
+        <p:cNvGrpSpPr/>
+        <p:nvPr/>
+      </p:nvGrpSpPr>
+      <p:grpSpPr>
+        <a:xfrm>
+          <a:off x="0" y="0"/>
+          <a:ext cx="0" cy="0"/>
+          <a:chOff x="0" y="0"/>
+          <a:chExt cx="0" cy="0"/>
+        </a:xfrm>
+      </p:grpSpPr>
+      <p:sp>
+        <p:nvSpPr>
+          <p:cNvPr id="2" name="Title 1">
+            <a:extLst>
+              <a:ext uri="{FF2B5EF4-FFF2-40B4-BE49-F238E27FC236}">
+                <a16:creationId xmlns:a16="http://schemas.microsoft.com/office/drawing/2014/main" id="{8EC63B1E-17CE-4044-840F-DD6BC79FA942}"/>
+              </a:ext>
+            </a:extLst>
+          </p:cNvPr>
+          <p:cNvSpPr>
+            <a:spLocks noGrp="1"/>
+          </p:cNvSpPr>
+          <p:nvPr>
+            <p:ph type="title"/>
+          </p:nvPr>
+        </p:nvSpPr>
+        <p:spPr/>
+        <p:txBody>
+          <a:bodyPr/>
+          <a:lstStyle/>
+          <a:p>
+            <a:endParaRPr lang="en-US"/>
+          </a:p>
+        </p:txBody>
+      </p:sp>
+      <p:pic>
+        <p:nvPicPr>
+          <p:cNvPr id="7" name="Content Placeholder 6">
+            <a:extLst>
+              <a:ext uri="{FF2B5EF4-FFF2-40B4-BE49-F238E27FC236}">
+                <a16:creationId xmlns:a16="http://schemas.microsoft.com/office/drawing/2014/main" id="{480845C5-0D5D-4F71-BF04-CF00B169D659}"/>
+              </a:ext>
+            </a:extLst>
+          </p:cNvPr>
+          <p:cNvPicPr>
+            <a:picLocks noGrp="1" noChangeAspect="1"/>
+          </p:cNvPicPr>
+          <p:nvPr>
+            <p:ph idx="1"/>
+          </p:nvPr>
+        </p:nvPicPr>
+        <p:blipFill>
+          <a:blip r:embed="rId2"/>
+          <a:stretch>
+            <a:fillRect/>
+          </a:stretch>
+        </p:blipFill>
+        <p:spPr>
+          <a:xfrm>
+            <a:off x="1135847" y="1427023"/>
+            <a:ext cx="6923105" cy="5013283"/>
+          </a:xfrm>
+        </p:spPr>
+      </p:pic>
+      <p:sp>
+        <p:nvSpPr>
+          <p:cNvPr id="4" name="Date Placeholder 3">
+            <a:extLst>
+              <a:ext uri="{FF2B5EF4-FFF2-40B4-BE49-F238E27FC236}">
+                <a16:creationId xmlns:a16="http://schemas.microsoft.com/office/drawing/2014/main" id="{D9022F2E-CADA-48B2-A92E-AA1FC3862C16}"/>
+              </a:ext>
+            </a:extLst>
+          </p:cNvPr>
+          <p:cNvSpPr>
+            <a:spLocks noGrp="1"/>
+          </p:cNvSpPr>
+          <p:nvPr>
+            <p:ph type="dt" sz="half" idx="10"/>
+          </p:nvPr>
+        </p:nvSpPr>
+        <p:spPr/>
+        <p:txBody>
+          <a:bodyPr/>
+          <a:lstStyle/>
+          <a:p>
+            <a:fld id="{7F6D23A5-47A9-D847-BD80-AD3152E19BC3}" type="datetime1">
+              <a:rPr lang="en-US" smtClean="0"/>
+              <a:t>3/3/2021</a:t>
+            </a:fld>
+            <a:endParaRPr lang="en-US"/>
+          </a:p>
+        </p:txBody>
+      </p:sp>
+      <p:sp>
+        <p:nvSpPr>
+          <p:cNvPr id="5" name="Slide Number Placeholder 4">
+            <a:extLst>
+              <a:ext uri="{FF2B5EF4-FFF2-40B4-BE49-F238E27FC236}">
+                <a16:creationId xmlns:a16="http://schemas.microsoft.com/office/drawing/2014/main" id="{5DC21327-AF3E-4220-A4A8-6D3D97730F11}"/>
+              </a:ext>
+            </a:extLst>
+          </p:cNvPr>
+          <p:cNvSpPr>
+            <a:spLocks noGrp="1"/>
+          </p:cNvSpPr>
+          <p:nvPr>
+            <p:ph type="sldNum" sz="quarter" idx="12"/>
+          </p:nvPr>
+        </p:nvSpPr>
+        <p:spPr/>
+        <p:txBody>
+          <a:bodyPr/>
+          <a:lstStyle/>
+          <a:p>
+            <a:pPr marL="43180">
+              <a:lnSpc>
+                <a:spcPts val="1240"/>
+              </a:lnSpc>
+            </a:pPr>
+            <a:r>
+              <a:rPr lang="en-GB" spc="-165"/>
+              <a:t>1-</a:t>
+            </a:r>
+            <a:fld id="{81D60167-4931-47E6-BA6A-407CBD079E47}" type="slidenum">
+              <a:rPr spc="-165" smtClean="0"/>
+              <a:t>8</a:t>
+            </a:fld>
+            <a:endParaRPr spc="-165" dirty="0"/>
+          </a:p>
+        </p:txBody>
+      </p:sp>
+    </p:spTree>
+    <p:extLst>
+      <p:ext uri="{BB962C8B-B14F-4D97-AF65-F5344CB8AC3E}">
+        <p14:creationId xmlns:p14="http://schemas.microsoft.com/office/powerpoint/2010/main" val="3633696993"/>
+      </p:ext>
+    </p:extLst>
+  </p:cSld>
+  <p:clrMapOvr>
+    <a:masterClrMapping/>
+  </p:clrMapOvr>
+</p:sld>
+</file>
+
+<file path=ppt/slides/slide9.xml><?xml version="1.0" encoding="utf-8"?>
+<p:sld xmlns:a="http://schemas.openxmlformats.org/drawingml/2006/main" xmlns:r="http://schemas.openxmlformats.org/officeDocument/2006/relationships" xmlns:p="http://schemas.openxmlformats.org/presentationml/2006/main">
+  <p:cSld>
+    <p:spTree>
+      <p:nvGrpSpPr>
+        <p:cNvPr id="1" name=""/>
+        <p:cNvGrpSpPr/>
+        <p:nvPr/>
+      </p:nvGrpSpPr>
+      <p:grpSpPr>
+        <a:xfrm>
+          <a:off x="0" y="0"/>
+          <a:ext cx="0" cy="0"/>
+          <a:chOff x="0" y="0"/>
+          <a:chExt cx="0" cy="0"/>
+        </a:xfrm>
+      </p:grpSpPr>
+      <p:sp>
+        <p:nvSpPr>
+          <p:cNvPr id="2" name="Title 1">
+            <a:extLst>
+              <a:ext uri="{FF2B5EF4-FFF2-40B4-BE49-F238E27FC236}">
+                <a16:creationId xmlns:a16="http://schemas.microsoft.com/office/drawing/2014/main" id="{CE9FEB00-E737-4D9D-91EB-E24839C2C7F7}"/>
+              </a:ext>
+            </a:extLst>
+          </p:cNvPr>
+          <p:cNvSpPr>
+            <a:spLocks noGrp="1"/>
+          </p:cNvSpPr>
+          <p:nvPr>
+            <p:ph type="title"/>
+          </p:nvPr>
+        </p:nvSpPr>
+        <p:spPr/>
+        <p:txBody>
+          <a:bodyPr/>
+          <a:lstStyle/>
+          <a:p>
+            <a:endParaRPr lang="en-US"/>
+          </a:p>
+        </p:txBody>
+      </p:sp>
+      <p:pic>
+        <p:nvPicPr>
+          <p:cNvPr id="9" name="Content Placeholder 8">
+            <a:extLst>
+              <a:ext uri="{FF2B5EF4-FFF2-40B4-BE49-F238E27FC236}">
+                <a16:creationId xmlns:a16="http://schemas.microsoft.com/office/drawing/2014/main" id="{CD166857-2635-48C1-B979-BBBA27B274FF}"/>
+              </a:ext>
+            </a:extLst>
+          </p:cNvPr>
+          <p:cNvPicPr>
+            <a:picLocks noGrp="1" noChangeAspect="1"/>
+          </p:cNvPicPr>
+          <p:nvPr>
+            <p:ph idx="1"/>
+          </p:nvPr>
+        </p:nvPicPr>
+        <p:blipFill>
+          <a:blip r:embed="rId2"/>
+          <a:stretch>
+            <a:fillRect/>
+          </a:stretch>
+        </p:blipFill>
+        <p:spPr>
+          <a:xfrm>
+            <a:off x="1220552" y="1439863"/>
+            <a:ext cx="6793383" cy="4892675"/>
+          </a:xfrm>
+        </p:spPr>
+      </p:pic>
+      <p:sp>
+        <p:nvSpPr>
+          <p:cNvPr id="4" name="Date Placeholder 3">
+            <a:extLst>
+              <a:ext uri="{FF2B5EF4-FFF2-40B4-BE49-F238E27FC236}">
+                <a16:creationId xmlns:a16="http://schemas.microsoft.com/office/drawing/2014/main" id="{D081A751-4C06-4FC2-BA48-1585BE7FC688}"/>
+              </a:ext>
+            </a:extLst>
+          </p:cNvPr>
+          <p:cNvSpPr>
+            <a:spLocks noGrp="1"/>
+          </p:cNvSpPr>
+          <p:nvPr>
+            <p:ph type="dt" sz="half" idx="10"/>
+          </p:nvPr>
+        </p:nvSpPr>
+        <p:spPr/>
+        <p:txBody>
+          <a:bodyPr/>
+          <a:lstStyle/>
+          <a:p>
+            <a:fld id="{7F6D23A5-47A9-D847-BD80-AD3152E19BC3}" type="datetime1">
+              <a:rPr lang="en-US" smtClean="0"/>
+              <a:t>3/3/2021</a:t>
+            </a:fld>
+            <a:endParaRPr lang="en-US"/>
+          </a:p>
+        </p:txBody>
+      </p:sp>
+      <p:sp>
+        <p:nvSpPr>
+          <p:cNvPr id="5" name="Slide Number Placeholder 4">
+            <a:extLst>
+              <a:ext uri="{FF2B5EF4-FFF2-40B4-BE49-F238E27FC236}">
+                <a16:creationId xmlns:a16="http://schemas.microsoft.com/office/drawing/2014/main" id="{FFA42477-809A-4464-BC16-79EC42F8AE44}"/>
+              </a:ext>
+            </a:extLst>
+          </p:cNvPr>
+          <p:cNvSpPr>
+            <a:spLocks noGrp="1"/>
+          </p:cNvSpPr>
+          <p:nvPr>
+            <p:ph type="sldNum" sz="quarter" idx="12"/>
+          </p:nvPr>
+        </p:nvSpPr>
+        <p:spPr/>
+        <p:txBody>
+          <a:bodyPr/>
+          <a:lstStyle/>
+          <a:p>
+            <a:pPr marL="43180">
+              <a:lnSpc>
+                <a:spcPts val="1240"/>
+              </a:lnSpc>
+            </a:pPr>
+            <a:r>
+              <a:rPr lang="en-GB" spc="-165"/>
+              <a:t>1-</a:t>
+            </a:r>
+            <a:fld id="{81D60167-4931-47E6-BA6A-407CBD079E47}" type="slidenum">
+              <a:rPr spc="-165" smtClean="0"/>
+              <a:t>9</a:t>
+            </a:fld>
+            <a:endParaRPr spc="-165" dirty="0"/>
+          </a:p>
+        </p:txBody>
+      </p:sp>
+    </p:spTree>
+    <p:extLst>
+      <p:ext uri="{BB962C8B-B14F-4D97-AF65-F5344CB8AC3E}">
+        <p14:creationId xmlns:p14="http://schemas.microsoft.com/office/powerpoint/2010/main" val="214807912"/>
       </p:ext>
     </p:extLst>
   </p:cSld>

</xml_diff>